<commit_message>
Updated INDY-AGENT ARM model (tweaks)
</commit_message>
<xml_diff>
--- a/src/HBB-SSI-Agents v0.8.pptx
+++ b/src/HBB-SSI-Agents v0.8.pptx
@@ -5101,7 +5101,7 @@
           </p:nvSpPr>
           <p:spPr>
             <a:xfrm>
-              <a:off x="3467865" y="3759501"/>
+              <a:off x="3453751" y="3626345"/>
               <a:ext cx="867600" cy="518400"/>
             </a:xfrm>
             <a:prstGeom prst="rect">
@@ -5204,7 +5204,7 @@
           </p:nvSpPr>
           <p:spPr>
             <a:xfrm>
-              <a:off x="3369228" y="4375353"/>
+              <a:off x="3328132" y="4375353"/>
               <a:ext cx="1115426" cy="276999"/>
             </a:xfrm>
             <a:prstGeom prst="rect">

</xml_diff>